<commit_message>
Link naar licentie aangepast obv andere NL producten (v4 van CC licentie)
</commit_message>
<xml_diff>
--- a/LeanUX_canvas_v5_NL1.pptx
+++ b/LeanUX_canvas_v5_NL1.pptx
@@ -557,10 +557,10 @@
           </a:ln>
           <a:extLst>
             <a:ext uri="{FAA26D3D-D897-4be2-8F04-BA451C77F1D7}">
-              <ma14:placeholderFlag xmlns="" xmlns:ma14="http://schemas.microsoft.com/office/mac/drawingml/2011/main" val="1"/>
+              <ma14:placeholderFlag xmlns:ma14="http://schemas.microsoft.com/office/mac/drawingml/2011/main" xmlns="" val="1"/>
             </a:ext>
             <a:ext uri="{909E8E84-426E-40dd-AFC4-6F175D3DCCD1}">
-              <a14:hiddenFill xmlns:a14="http://schemas.microsoft.com/office/drawing/2010/main" xmlns="">
+              <a14:hiddenFill xmlns="" xmlns:a14="http://schemas.microsoft.com/office/drawing/2010/main">
                 <a:solidFill>
                   <a:srgbClr val="FFFFFF"/>
                 </a:solidFill>
@@ -1097,8 +1097,13 @@
             </a:r>
             <a:r>
               <a:rPr lang="en-US" dirty="0"/>
-              <a:t>/3.0/ </a:t>
-            </a:r>
+              <a:t>/4.0/</a:t>
+            </a:r>
+            <a:r>
+              <a:rPr lang="en-US" dirty="0" err="1"/>
+              <a:t>deed.nl</a:t>
+            </a:r>
+            <a:endParaRPr lang="en-US" dirty="0"/>
           </a:p>
           <a:p>
             <a:r>
@@ -1436,8 +1441,13 @@
             </a:r>
             <a:r>
               <a:rPr lang="en-US" dirty="0"/>
-              <a:t>/3.0/ </a:t>
-            </a:r>
+              <a:t>/4.0/</a:t>
+            </a:r>
+            <a:r>
+              <a:rPr lang="en-US" dirty="0" err="1"/>
+              <a:t>deed.nl</a:t>
+            </a:r>
+            <a:endParaRPr lang="en-US" dirty="0"/>
           </a:p>
           <a:p>
             <a:r>
@@ -1505,7 +1515,7 @@
               <a:t> op http://</a:t>
             </a:r>
             <a:r>
-              <a:rPr lang="en-US"/>
+              <a:rPr lang="en-US" dirty="0" err="1"/>
               <a:t>www.scrumfacilitators.nl</a:t>
             </a:r>
             <a:endParaRPr lang="en-US" dirty="0"/>
@@ -4476,17 +4486,17 @@
           </a:ln>
           <a:extLst>
             <a:ext uri="{FAA26D3D-D897-4be2-8F04-BA451C77F1D7}">
-              <ma14:placeholderFlag xmlns="" xmlns:ma14="http://schemas.microsoft.com/office/mac/drawingml/2011/main" val="1"/>
+              <ma14:placeholderFlag xmlns:ma14="http://schemas.microsoft.com/office/mac/drawingml/2011/main" xmlns="" val="1"/>
             </a:ext>
             <a:ext uri="{909E8E84-426E-40dd-AFC4-6F175D3DCCD1}">
-              <a14:hiddenFill xmlns:a14="http://schemas.microsoft.com/office/drawing/2010/main" xmlns="">
+              <a14:hiddenFill xmlns="" xmlns:a14="http://schemas.microsoft.com/office/drawing/2010/main">
                 <a:solidFill>
                   <a:srgbClr val="FFFFFF"/>
                 </a:solidFill>
               </a14:hiddenFill>
             </a:ext>
             <a:ext uri="{91240B29-F687-4f45-9708-019B960494DF}">
-              <a14:hiddenLine xmlns:a14="http://schemas.microsoft.com/office/drawing/2010/main" xmlns="" w="9525">
+              <a14:hiddenLine xmlns="" xmlns:a14="http://schemas.microsoft.com/office/drawing/2010/main" w="9525">
                 <a:solidFill>
                   <a:srgbClr val="000000"/>
                 </a:solidFill>
@@ -4537,17 +4547,17 @@
           </a:ln>
           <a:extLst>
             <a:ext uri="{FAA26D3D-D897-4be2-8F04-BA451C77F1D7}">
-              <ma14:placeholderFlag xmlns="" xmlns:ma14="http://schemas.microsoft.com/office/mac/drawingml/2011/main" val="1"/>
+              <ma14:placeholderFlag xmlns:ma14="http://schemas.microsoft.com/office/mac/drawingml/2011/main" xmlns="" val="1"/>
             </a:ext>
             <a:ext uri="{909E8E84-426E-40dd-AFC4-6F175D3DCCD1}">
-              <a14:hiddenFill xmlns:a14="http://schemas.microsoft.com/office/drawing/2010/main" xmlns="">
+              <a14:hiddenFill xmlns="" xmlns:a14="http://schemas.microsoft.com/office/drawing/2010/main">
                 <a:solidFill>
                   <a:srgbClr val="FFFFFF"/>
                 </a:solidFill>
               </a14:hiddenFill>
             </a:ext>
             <a:ext uri="{91240B29-F687-4f45-9708-019B960494DF}">
-              <a14:hiddenLine xmlns:a14="http://schemas.microsoft.com/office/drawing/2010/main" xmlns="" w="9525">
+              <a14:hiddenLine xmlns="" xmlns:a14="http://schemas.microsoft.com/office/drawing/2010/main" w="9525">
                 <a:solidFill>
                   <a:srgbClr val="000000"/>
                 </a:solidFill>
@@ -5243,14 +5253,14 @@
           </a:ln>
           <a:extLst>
             <a:ext uri="{909E8E84-426E-40dd-AFC4-6F175D3DCCD1}">
-              <a14:hiddenFill xmlns:a14="http://schemas.microsoft.com/office/drawing/2010/main" xmlns="">
+              <a14:hiddenFill xmlns="" xmlns:a14="http://schemas.microsoft.com/office/drawing/2010/main">
                 <a:solidFill>
                   <a:srgbClr val="FFFFFF"/>
                 </a:solidFill>
               </a14:hiddenFill>
             </a:ext>
             <a:ext uri="{91240B29-F687-4f45-9708-019B960494DF}">
-              <a14:hiddenLine xmlns:a14="http://schemas.microsoft.com/office/drawing/2010/main" xmlns="" w="9525">
+              <a14:hiddenLine xmlns="" xmlns:a14="http://schemas.microsoft.com/office/drawing/2010/main" w="9525">
                 <a:solidFill>
                   <a:srgbClr val="000000"/>
                 </a:solidFill>
@@ -5971,7 +5981,7 @@
           </a:ln>
           <a:extLst>
             <a:ext uri="{91240B29-F687-4f45-9708-019B960494DF}">
-              <a14:hiddenLine xmlns:a14="http://schemas.microsoft.com/office/drawing/2010/main" xmlns="" w="3175">
+              <a14:hiddenLine xmlns="" xmlns:a14="http://schemas.microsoft.com/office/drawing/2010/main" w="3175">
                 <a:solidFill>
                   <a:srgbClr val="000000"/>
                 </a:solidFill>
@@ -6021,7 +6031,7 @@
           </a:ln>
           <a:extLst>
             <a:ext uri="{91240B29-F687-4f45-9708-019B960494DF}">
-              <a14:hiddenLine xmlns:a14="http://schemas.microsoft.com/office/drawing/2010/main" xmlns="" w="3175">
+              <a14:hiddenLine xmlns="" xmlns:a14="http://schemas.microsoft.com/office/drawing/2010/main" w="3175">
                 <a:solidFill>
                   <a:srgbClr val="000000"/>
                 </a:solidFill>
@@ -6071,7 +6081,7 @@
           </a:ln>
           <a:extLst>
             <a:ext uri="{91240B29-F687-4f45-9708-019B960494DF}">
-              <a14:hiddenLine xmlns:a14="http://schemas.microsoft.com/office/drawing/2010/main" xmlns="" w="3175">
+              <a14:hiddenLine xmlns="" xmlns:a14="http://schemas.microsoft.com/office/drawing/2010/main" w="3175">
                 <a:solidFill>
                   <a:srgbClr val="000000"/>
                 </a:solidFill>
@@ -6699,14 +6709,14 @@
           </a:ln>
           <a:extLst>
             <a:ext uri="{909E8E84-426E-40dd-AFC4-6F175D3DCCD1}">
-              <a14:hiddenFill xmlns:a14="http://schemas.microsoft.com/office/drawing/2010/main" xmlns="">
+              <a14:hiddenFill xmlns="" xmlns:a14="http://schemas.microsoft.com/office/drawing/2010/main">
                 <a:solidFill>
                   <a:srgbClr val="FFFFFF"/>
                 </a:solidFill>
               </a14:hiddenFill>
             </a:ext>
             <a:ext uri="{91240B29-F687-4f45-9708-019B960494DF}">
-              <a14:hiddenLine xmlns:a14="http://schemas.microsoft.com/office/drawing/2010/main" xmlns="" w="9525">
+              <a14:hiddenLine xmlns="" xmlns:a14="http://schemas.microsoft.com/office/drawing/2010/main" w="9525">
                 <a:solidFill>
                   <a:srgbClr val="000000"/>
                 </a:solidFill>
@@ -7427,7 +7437,7 @@
           </a:ln>
           <a:extLst>
             <a:ext uri="{91240B29-F687-4f45-9708-019B960494DF}">
-              <a14:hiddenLine xmlns:a14="http://schemas.microsoft.com/office/drawing/2010/main" xmlns="" w="3175">
+              <a14:hiddenLine xmlns="" xmlns:a14="http://schemas.microsoft.com/office/drawing/2010/main" w="3175">
                 <a:solidFill>
                   <a:srgbClr val="000000"/>
                 </a:solidFill>
@@ -7477,7 +7487,7 @@
           </a:ln>
           <a:extLst>
             <a:ext uri="{91240B29-F687-4f45-9708-019B960494DF}">
-              <a14:hiddenLine xmlns:a14="http://schemas.microsoft.com/office/drawing/2010/main" xmlns="" w="3175">
+              <a14:hiddenLine xmlns="" xmlns:a14="http://schemas.microsoft.com/office/drawing/2010/main" w="3175">
                 <a:solidFill>
                   <a:srgbClr val="000000"/>
                 </a:solidFill>
@@ -7527,7 +7537,7 @@
           </a:ln>
           <a:extLst>
             <a:ext uri="{91240B29-F687-4f45-9708-019B960494DF}">
-              <a14:hiddenLine xmlns:a14="http://schemas.microsoft.com/office/drawing/2010/main" xmlns="" w="3175">
+              <a14:hiddenLine xmlns="" xmlns:a14="http://schemas.microsoft.com/office/drawing/2010/main" w="3175">
                 <a:solidFill>
                   <a:srgbClr val="000000"/>
                 </a:solidFill>
@@ -8707,14 +8717,14 @@
           </a:ln>
           <a:extLst>
             <a:ext uri="{909E8E84-426E-40dd-AFC4-6F175D3DCCD1}">
-              <a14:hiddenFill xmlns:a14="http://schemas.microsoft.com/office/drawing/2010/main" xmlns="">
+              <a14:hiddenFill xmlns="" xmlns:a14="http://schemas.microsoft.com/office/drawing/2010/main">
                 <a:solidFill>
                   <a:srgbClr val="FFFFFF"/>
                 </a:solidFill>
               </a14:hiddenFill>
             </a:ext>
             <a:ext uri="{91240B29-F687-4f45-9708-019B960494DF}">
-              <a14:hiddenLine xmlns:a14="http://schemas.microsoft.com/office/drawing/2010/main" xmlns="" w="9525">
+              <a14:hiddenLine xmlns="" xmlns:a14="http://schemas.microsoft.com/office/drawing/2010/main" w="9525">
                 <a:solidFill>
                   <a:srgbClr val="000000"/>
                 </a:solidFill>
@@ -9391,7 +9401,7 @@
           </a:ln>
           <a:extLst>
             <a:ext uri="{91240B29-F687-4f45-9708-019B960494DF}">
-              <a14:hiddenLine xmlns:a14="http://schemas.microsoft.com/office/drawing/2010/main" xmlns="" w="3175">
+              <a14:hiddenLine xmlns="" xmlns:a14="http://schemas.microsoft.com/office/drawing/2010/main" w="3175">
                 <a:solidFill>
                   <a:srgbClr val="000000"/>
                 </a:solidFill>
@@ -9441,7 +9451,7 @@
           </a:ln>
           <a:extLst>
             <a:ext uri="{91240B29-F687-4f45-9708-019B960494DF}">
-              <a14:hiddenLine xmlns:a14="http://schemas.microsoft.com/office/drawing/2010/main" xmlns="" w="3175">
+              <a14:hiddenLine xmlns="" xmlns:a14="http://schemas.microsoft.com/office/drawing/2010/main" w="3175">
                 <a:solidFill>
                   <a:srgbClr val="000000"/>
                 </a:solidFill>
@@ -9491,7 +9501,7 @@
           </a:ln>
           <a:extLst>
             <a:ext uri="{91240B29-F687-4f45-9708-019B960494DF}">
-              <a14:hiddenLine xmlns:a14="http://schemas.microsoft.com/office/drawing/2010/main" xmlns="" w="3175">
+              <a14:hiddenLine xmlns="" xmlns:a14="http://schemas.microsoft.com/office/drawing/2010/main" w="3175">
                 <a:solidFill>
                   <a:srgbClr val="000000"/>
                 </a:solidFill>
@@ -10090,14 +10100,14 @@
           </a:ln>
           <a:extLst>
             <a:ext uri="{909E8E84-426E-40dd-AFC4-6F175D3DCCD1}">
-              <a14:hiddenFill xmlns:a14="http://schemas.microsoft.com/office/drawing/2010/main" xmlns="">
+              <a14:hiddenFill xmlns="" xmlns:a14="http://schemas.microsoft.com/office/drawing/2010/main">
                 <a:solidFill>
                   <a:srgbClr val="FFFFFF"/>
                 </a:solidFill>
               </a14:hiddenFill>
             </a:ext>
             <a:ext uri="{91240B29-F687-4f45-9708-019B960494DF}">
-              <a14:hiddenLine xmlns:a14="http://schemas.microsoft.com/office/drawing/2010/main" xmlns="" w="9525">
+              <a14:hiddenLine xmlns="" xmlns:a14="http://schemas.microsoft.com/office/drawing/2010/main" w="9525">
                 <a:solidFill>
                   <a:srgbClr val="000000"/>
                 </a:solidFill>
@@ -10774,7 +10784,7 @@
           </a:ln>
           <a:extLst>
             <a:ext uri="{91240B29-F687-4f45-9708-019B960494DF}">
-              <a14:hiddenLine xmlns:a14="http://schemas.microsoft.com/office/drawing/2010/main" xmlns="" w="3175">
+              <a14:hiddenLine xmlns="" xmlns:a14="http://schemas.microsoft.com/office/drawing/2010/main" w="3175">
                 <a:solidFill>
                   <a:srgbClr val="000000"/>
                 </a:solidFill>
@@ -10824,7 +10834,7 @@
           </a:ln>
           <a:extLst>
             <a:ext uri="{91240B29-F687-4f45-9708-019B960494DF}">
-              <a14:hiddenLine xmlns:a14="http://schemas.microsoft.com/office/drawing/2010/main" xmlns="" w="3175">
+              <a14:hiddenLine xmlns="" xmlns:a14="http://schemas.microsoft.com/office/drawing/2010/main" w="3175">
                 <a:solidFill>
                   <a:srgbClr val="000000"/>
                 </a:solidFill>
@@ -10874,7 +10884,7 @@
           </a:ln>
           <a:extLst>
             <a:ext uri="{91240B29-F687-4f45-9708-019B960494DF}">
-              <a14:hiddenLine xmlns:a14="http://schemas.microsoft.com/office/drawing/2010/main" xmlns="" w="3175">
+              <a14:hiddenLine xmlns="" xmlns:a14="http://schemas.microsoft.com/office/drawing/2010/main" w="3175">
                 <a:solidFill>
                   <a:srgbClr val="000000"/>
                 </a:solidFill>

</xml_diff>